<commit_message>
Modified model results tables
</commit_message>
<xml_diff>
--- a/docs/fanli.pptx
+++ b/docs/fanli.pptx
@@ -114,6 +114,11 @@
       </a:defRPr>
     </a:lvl9pPr>
   </p:defaultTextStyle>
+  <p:extLst>
+    <p:ext uri="{EFAFB233-063F-42B5-8137-9DF3F51BA10A}">
+      <p15:sldGuideLst xmlns:p15="http://schemas.microsoft.com/office/powerpoint/2012/main"/>
+    </p:ext>
+  </p:extLst>
 </p:presentation>
 </file>
 
@@ -199,7 +204,7 @@
           <a:p>
             <a:fld id="{01FB8E41-E571-43B7-BE23-B47C42FFC7A4}" type="datetimeFigureOut">
               <a:rPr lang="en-US" smtClean="0"/>
-              <a:t>6/14/2020</a:t>
+              <a:t>6/15/2020</a:t>
             </a:fld>
             <a:endParaRPr lang="en-US"/>
           </a:p>
@@ -985,7 +990,7 @@
           <a:p>
             <a:fld id="{288FBDA1-A40B-4D81-9B4C-00CD852D5B69}" type="datetimeFigureOut">
               <a:rPr lang="en-US" smtClean="0"/>
-              <a:t>6/14/2020</a:t>
+              <a:t>6/15/2020</a:t>
             </a:fld>
             <a:endParaRPr lang="en-US"/>
           </a:p>
@@ -1183,7 +1188,7 @@
           <a:p>
             <a:fld id="{288FBDA1-A40B-4D81-9B4C-00CD852D5B69}" type="datetimeFigureOut">
               <a:rPr lang="en-US" smtClean="0"/>
-              <a:t>6/14/2020</a:t>
+              <a:t>6/15/2020</a:t>
             </a:fld>
             <a:endParaRPr lang="en-US"/>
           </a:p>
@@ -1391,7 +1396,7 @@
           <a:p>
             <a:fld id="{288FBDA1-A40B-4D81-9B4C-00CD852D5B69}" type="datetimeFigureOut">
               <a:rPr lang="en-US" smtClean="0"/>
-              <a:t>6/14/2020</a:t>
+              <a:t>6/15/2020</a:t>
             </a:fld>
             <a:endParaRPr lang="en-US"/>
           </a:p>
@@ -1589,7 +1594,7 @@
           <a:p>
             <a:fld id="{288FBDA1-A40B-4D81-9B4C-00CD852D5B69}" type="datetimeFigureOut">
               <a:rPr lang="en-US" smtClean="0"/>
-              <a:t>6/14/2020</a:t>
+              <a:t>6/15/2020</a:t>
             </a:fld>
             <a:endParaRPr lang="en-US"/>
           </a:p>
@@ -1864,7 +1869,7 @@
           <a:p>
             <a:fld id="{288FBDA1-A40B-4D81-9B4C-00CD852D5B69}" type="datetimeFigureOut">
               <a:rPr lang="en-US" smtClean="0"/>
-              <a:t>6/14/2020</a:t>
+              <a:t>6/15/2020</a:t>
             </a:fld>
             <a:endParaRPr lang="en-US"/>
           </a:p>
@@ -2129,7 +2134,7 @@
           <a:p>
             <a:fld id="{288FBDA1-A40B-4D81-9B4C-00CD852D5B69}" type="datetimeFigureOut">
               <a:rPr lang="en-US" smtClean="0"/>
-              <a:t>6/14/2020</a:t>
+              <a:t>6/15/2020</a:t>
             </a:fld>
             <a:endParaRPr lang="en-US"/>
           </a:p>
@@ -2541,7 +2546,7 @@
           <a:p>
             <a:fld id="{288FBDA1-A40B-4D81-9B4C-00CD852D5B69}" type="datetimeFigureOut">
               <a:rPr lang="en-US" smtClean="0"/>
-              <a:t>6/14/2020</a:t>
+              <a:t>6/15/2020</a:t>
             </a:fld>
             <a:endParaRPr lang="en-US"/>
           </a:p>
@@ -2682,7 +2687,7 @@
           <a:p>
             <a:fld id="{288FBDA1-A40B-4D81-9B4C-00CD852D5B69}" type="datetimeFigureOut">
               <a:rPr lang="en-US" smtClean="0"/>
-              <a:t>6/14/2020</a:t>
+              <a:t>6/15/2020</a:t>
             </a:fld>
             <a:endParaRPr lang="en-US"/>
           </a:p>
@@ -2795,7 +2800,7 @@
           <a:p>
             <a:fld id="{288FBDA1-A40B-4D81-9B4C-00CD852D5B69}" type="datetimeFigureOut">
               <a:rPr lang="en-US" smtClean="0"/>
-              <a:t>6/14/2020</a:t>
+              <a:t>6/15/2020</a:t>
             </a:fld>
             <a:endParaRPr lang="en-US"/>
           </a:p>
@@ -3106,7 +3111,7 @@
           <a:p>
             <a:fld id="{288FBDA1-A40B-4D81-9B4C-00CD852D5B69}" type="datetimeFigureOut">
               <a:rPr lang="en-US" smtClean="0"/>
-              <a:t>6/14/2020</a:t>
+              <a:t>6/15/2020</a:t>
             </a:fld>
             <a:endParaRPr lang="en-US"/>
           </a:p>
@@ -3394,7 +3399,7 @@
           <a:p>
             <a:fld id="{288FBDA1-A40B-4D81-9B4C-00CD852D5B69}" type="datetimeFigureOut">
               <a:rPr lang="en-US" smtClean="0"/>
-              <a:t>6/14/2020</a:t>
+              <a:t>6/15/2020</a:t>
             </a:fld>
             <a:endParaRPr lang="en-US"/>
           </a:p>
@@ -3635,7 +3640,7 @@
           <a:p>
             <a:fld id="{288FBDA1-A40B-4D81-9B4C-00CD852D5B69}" type="datetimeFigureOut">
               <a:rPr lang="en-US" smtClean="0"/>
-              <a:t>6/14/2020</a:t>
+              <a:t>6/15/2020</a:t>
             </a:fld>
             <a:endParaRPr lang="en-US"/>
           </a:p>
@@ -4885,14 +4890,14 @@
           <p:nvPr>
             <p:extLst>
               <p:ext uri="{D42A27DB-BD31-4B8C-83A1-F6EECF244321}">
-                <p14:modId xmlns:p14="http://schemas.microsoft.com/office/powerpoint/2010/main" val="3777802358"/>
+                <p14:modId xmlns:p14="http://schemas.microsoft.com/office/powerpoint/2010/main" val="907669622"/>
               </p:ext>
             </p:extLst>
           </p:nvPr>
         </p:nvGraphicFramePr>
         <p:xfrm>
           <a:off x="769620" y="2534305"/>
-          <a:ext cx="10645140" cy="2587776"/>
+          <a:ext cx="10645144" cy="2792149"/>
         </p:xfrm>
         <a:graphic>
           <a:graphicData uri="http://schemas.openxmlformats.org/drawingml/2006/table">
@@ -4915,7 +4920,7 @@
                     </a:ext>
                   </a:extLst>
                 </a:gridCol>
-                <a:gridCol w="906780">
+                <a:gridCol w="906781">
                   <a:extLst>
                     <a:ext uri="{9D8B030D-6E8A-4147-A177-3AD203B41FA5}">
                       <a16:colId xmlns:a16="http://schemas.microsoft.com/office/drawing/2014/main" val="4155945170"/>
@@ -4929,7 +4934,7 @@
                     </a:ext>
                   </a:extLst>
                 </a:gridCol>
-                <a:gridCol w="876300">
+                <a:gridCol w="876301">
                   <a:extLst>
                     <a:ext uri="{9D8B030D-6E8A-4147-A177-3AD203B41FA5}">
                       <a16:colId xmlns:a16="http://schemas.microsoft.com/office/drawing/2014/main" val="1765691710"/>
@@ -4943,14 +4948,14 @@
                     </a:ext>
                   </a:extLst>
                 </a:gridCol>
-                <a:gridCol w="1150620">
+                <a:gridCol w="1150621">
                   <a:extLst>
                     <a:ext uri="{9D8B030D-6E8A-4147-A177-3AD203B41FA5}">
                       <a16:colId xmlns:a16="http://schemas.microsoft.com/office/drawing/2014/main" val="2692160144"/>
                     </a:ext>
                   </a:extLst>
                 </a:gridCol>
-                <a:gridCol w="952500">
+                <a:gridCol w="952501">
                   <a:extLst>
                     <a:ext uri="{9D8B030D-6E8A-4147-A177-3AD203B41FA5}">
                       <a16:colId xmlns:a16="http://schemas.microsoft.com/office/drawing/2014/main" val="1671396394"/>
@@ -4972,7 +4977,7 @@
                   </a:extLst>
                 </a:gridCol>
               </a:tblGrid>
-              <a:tr h="296091">
+              <a:tr h="670368">
                 <a:tc>
                   <a:txBody>
                     <a:bodyPr/>
@@ -4986,7 +4991,7 @@
                   </a:txBody>
                   <a:tcPr marL="21771" marR="21771" marT="21771" marB="21771" anchor="ctr"/>
                 </a:tc>
-                <a:tc gridSpan="8">
+                <a:tc gridSpan="7">
                   <a:txBody>
                     <a:bodyPr/>
                     <a:lstStyle/>
@@ -5080,20 +5085,7 @@
                   </a:txBody>
                   <a:tcPr marL="21771" marR="21771" marT="21771" marB="21771" anchor="ctr"/>
                 </a:tc>
-                <a:tc hMerge="1">
-                  <a:txBody>
-                    <a:bodyPr/>
-                    <a:lstStyle/>
-                    <a:p>
-                      <a:pPr algn="l" fontAlgn="ctr"/>
-                      <a:endParaRPr lang="en-US" b="1" dirty="0">
-                        <a:effectLst/>
-                      </a:endParaRPr>
-                    </a:p>
-                  </a:txBody>
-                  <a:tcPr marL="21771" marR="21771" marT="21771" marB="21771" anchor="ctr"/>
-                </a:tc>
-                <a:tc>
+                <a:tc gridSpan="2">
                   <a:txBody>
                     <a:bodyPr/>
                     <a:lstStyle/>
@@ -5114,6 +5106,19 @@
                         </a:rPr>
                         <a:t> Evaluation</a:t>
                       </a:r>
+                    </a:p>
+                  </a:txBody>
+                  <a:tcPr marL="21771" marR="21771" marT="21771" marB="21771" anchor="ctr"/>
+                </a:tc>
+                <a:tc hMerge="1">
+                  <a:txBody>
+                    <a:bodyPr/>
+                    <a:lstStyle/>
+                    <a:p>
+                      <a:pPr algn="ctr" fontAlgn="ctr"/>
+                      <a:endParaRPr lang="en-US" sz="2000" b="1" dirty="0">
+                        <a:effectLst/>
+                      </a:endParaRPr>
                     </a:p>
                   </a:txBody>
                   <a:tcPr marL="21771" marR="21771" marT="21771" marB="21771" anchor="ctr"/>
@@ -5124,7 +5129,7 @@
                   </a:ext>
                 </a:extLst>
               </a:tr>
-              <a:tr h="296091">
+              <a:tr h="495656">
                 <a:tc>
                   <a:txBody>
                     <a:bodyPr/>
@@ -5291,7 +5296,7 @@
                   </a:ext>
                 </a:extLst>
               </a:tr>
-              <a:tr h="370840">
+              <a:tr h="436073">
                 <a:tc>
                   <a:txBody>
                     <a:bodyPr/>
@@ -5898,12 +5903,47 @@
           </a:p>
         </p:txBody>
       </p:sp>
+      <p:sp>
+        <p:nvSpPr>
+          <p:cNvPr id="9" name="TextBox 8">
+            <a:extLst>
+              <a:ext uri="{FF2B5EF4-FFF2-40B4-BE49-F238E27FC236}">
+                <a16:creationId xmlns:a16="http://schemas.microsoft.com/office/drawing/2014/main" id="{0A0EB1C9-EE75-4ED6-87DB-D4575EC4413D}"/>
+              </a:ext>
+            </a:extLst>
+          </p:cNvPr>
+          <p:cNvSpPr txBox="1"/>
+          <p:nvPr/>
+        </p:nvSpPr>
+        <p:spPr>
+          <a:xfrm>
+            <a:off x="708660" y="1496675"/>
+            <a:ext cx="3904915" cy="461665"/>
+          </a:xfrm>
+          <a:prstGeom prst="rect">
+            <a:avLst/>
+          </a:prstGeom>
+          <a:noFill/>
+        </p:spPr>
+        <p:txBody>
+          <a:bodyPr wrap="none" rtlCol="0">
+            <a:spAutoFit/>
+          </a:bodyPr>
+          <a:lstStyle/>
+          <a:p>
+            <a:r>
+              <a:rPr lang="en-US" sz="2400" b="1" dirty="0"/>
+              <a:t>Testing Model Generalization</a:t>
+            </a:r>
+          </a:p>
+        </p:txBody>
+      </p:sp>
       <p:graphicFrame>
         <p:nvGraphicFramePr>
-          <p:cNvPr id="8" name="Table 3">
-            <a:extLst>
-              <a:ext uri="{FF2B5EF4-FFF2-40B4-BE49-F238E27FC236}">
-                <a16:creationId xmlns:a16="http://schemas.microsoft.com/office/drawing/2014/main" id="{889AE9E8-596B-4D47-ACAE-EB8C94F87AD5}"/>
+          <p:cNvPr id="10" name="Table 3">
+            <a:extLst>
+              <a:ext uri="{FF2B5EF4-FFF2-40B4-BE49-F238E27FC236}">
+                <a16:creationId xmlns:a16="http://schemas.microsoft.com/office/drawing/2014/main" id="{98653ECC-507A-4C16-BF73-9726034D106D}"/>
               </a:ext>
             </a:extLst>
           </p:cNvPr>
@@ -5913,14 +5953,14 @@
           <p:nvPr>
             <p:extLst>
               <p:ext uri="{D42A27DB-BD31-4B8C-83A1-F6EECF244321}">
-                <p14:modId xmlns:p14="http://schemas.microsoft.com/office/powerpoint/2010/main" val="3439868358"/>
+                <p14:modId xmlns:p14="http://schemas.microsoft.com/office/powerpoint/2010/main" val="3847877072"/>
               </p:ext>
             </p:extLst>
           </p:nvPr>
         </p:nvGraphicFramePr>
         <p:xfrm>
           <a:off x="769620" y="2534305"/>
-          <a:ext cx="10645140" cy="2587776"/>
+          <a:ext cx="10645144" cy="2792149"/>
         </p:xfrm>
         <a:graphic>
           <a:graphicData uri="http://schemas.openxmlformats.org/drawingml/2006/table">
@@ -5943,7 +5983,7 @@
                     </a:ext>
                   </a:extLst>
                 </a:gridCol>
-                <a:gridCol w="906780">
+                <a:gridCol w="906781">
                   <a:extLst>
                     <a:ext uri="{9D8B030D-6E8A-4147-A177-3AD203B41FA5}">
                       <a16:colId xmlns:a16="http://schemas.microsoft.com/office/drawing/2014/main" val="4155945170"/>
@@ -5957,7 +5997,7 @@
                     </a:ext>
                   </a:extLst>
                 </a:gridCol>
-                <a:gridCol w="876300">
+                <a:gridCol w="876301">
                   <a:extLst>
                     <a:ext uri="{9D8B030D-6E8A-4147-A177-3AD203B41FA5}">
                       <a16:colId xmlns:a16="http://schemas.microsoft.com/office/drawing/2014/main" val="1765691710"/>
@@ -5971,14 +6011,14 @@
                     </a:ext>
                   </a:extLst>
                 </a:gridCol>
-                <a:gridCol w="1150620">
+                <a:gridCol w="1150621">
                   <a:extLst>
                     <a:ext uri="{9D8B030D-6E8A-4147-A177-3AD203B41FA5}">
                       <a16:colId xmlns:a16="http://schemas.microsoft.com/office/drawing/2014/main" val="2692160144"/>
                     </a:ext>
                   </a:extLst>
                 </a:gridCol>
-                <a:gridCol w="952500">
+                <a:gridCol w="952501">
                   <a:extLst>
                     <a:ext uri="{9D8B030D-6E8A-4147-A177-3AD203B41FA5}">
                       <a16:colId xmlns:a16="http://schemas.microsoft.com/office/drawing/2014/main" val="1671396394"/>
@@ -6000,7 +6040,7 @@
                   </a:extLst>
                 </a:gridCol>
               </a:tblGrid>
-              <a:tr h="296091">
+              <a:tr h="670368">
                 <a:tc>
                   <a:txBody>
                     <a:bodyPr/>
@@ -6014,7 +6054,7 @@
                   </a:txBody>
                   <a:tcPr marL="21771" marR="21771" marT="21771" marB="21771" anchor="ctr"/>
                 </a:tc>
-                <a:tc gridSpan="8">
+                <a:tc gridSpan="7">
                   <a:txBody>
                     <a:bodyPr/>
                     <a:lstStyle/>
@@ -6108,20 +6148,7 @@
                   </a:txBody>
                   <a:tcPr marL="21771" marR="21771" marT="21771" marB="21771" anchor="ctr"/>
                 </a:tc>
-                <a:tc hMerge="1">
-                  <a:txBody>
-                    <a:bodyPr/>
-                    <a:lstStyle/>
-                    <a:p>
-                      <a:pPr algn="l" fontAlgn="ctr"/>
-                      <a:endParaRPr lang="en-US" b="1" dirty="0">
-                        <a:effectLst/>
-                      </a:endParaRPr>
-                    </a:p>
-                  </a:txBody>
-                  <a:tcPr marL="21771" marR="21771" marT="21771" marB="21771" anchor="ctr"/>
-                </a:tc>
-                <a:tc>
+                <a:tc gridSpan="2">
                   <a:txBody>
                     <a:bodyPr/>
                     <a:lstStyle/>
@@ -6142,6 +6169,19 @@
                         </a:rPr>
                         <a:t> Evaluation</a:t>
                       </a:r>
+                    </a:p>
+                  </a:txBody>
+                  <a:tcPr marL="21771" marR="21771" marT="21771" marB="21771" anchor="ctr"/>
+                </a:tc>
+                <a:tc hMerge="1">
+                  <a:txBody>
+                    <a:bodyPr/>
+                    <a:lstStyle/>
+                    <a:p>
+                      <a:pPr algn="ctr" fontAlgn="ctr"/>
+                      <a:endParaRPr lang="en-US" sz="2000" b="1" dirty="0">
+                        <a:effectLst/>
+                      </a:endParaRPr>
                     </a:p>
                   </a:txBody>
                   <a:tcPr marL="21771" marR="21771" marT="21771" marB="21771" anchor="ctr"/>
@@ -6152,7 +6192,7 @@
                   </a:ext>
                 </a:extLst>
               </a:tr>
-              <a:tr h="296091">
+              <a:tr h="495656">
                 <a:tc>
                   <a:txBody>
                     <a:bodyPr/>
@@ -6319,7 +6359,7 @@
                   </a:ext>
                 </a:extLst>
               </a:tr>
-              <a:tr h="370840">
+              <a:tr h="436073">
                 <a:tc>
                   <a:txBody>
                     <a:bodyPr/>
@@ -6818,41 +6858,6 @@
           </a:graphicData>
         </a:graphic>
       </p:graphicFrame>
-      <p:sp>
-        <p:nvSpPr>
-          <p:cNvPr id="9" name="TextBox 8">
-            <a:extLst>
-              <a:ext uri="{FF2B5EF4-FFF2-40B4-BE49-F238E27FC236}">
-                <a16:creationId xmlns:a16="http://schemas.microsoft.com/office/drawing/2014/main" id="{0A0EB1C9-EE75-4ED6-87DB-D4575EC4413D}"/>
-              </a:ext>
-            </a:extLst>
-          </p:cNvPr>
-          <p:cNvSpPr txBox="1"/>
-          <p:nvPr/>
-        </p:nvSpPr>
-        <p:spPr>
-          <a:xfrm>
-            <a:off x="708660" y="1496675"/>
-            <a:ext cx="3904915" cy="461665"/>
-          </a:xfrm>
-          <a:prstGeom prst="rect">
-            <a:avLst/>
-          </a:prstGeom>
-          <a:noFill/>
-        </p:spPr>
-        <p:txBody>
-          <a:bodyPr wrap="none" rtlCol="0">
-            <a:spAutoFit/>
-          </a:bodyPr>
-          <a:lstStyle/>
-          <a:p>
-            <a:r>
-              <a:rPr lang="en-US" sz="2400" b="1" dirty="0"/>
-              <a:t>Testing Model Generalization</a:t>
-            </a:r>
-          </a:p>
-        </p:txBody>
-      </p:sp>
     </p:spTree>
     <p:extLst>
       <p:ext uri="{BB962C8B-B14F-4D97-AF65-F5344CB8AC3E}">

</xml_diff>

<commit_message>
Added one slide to fanli slides
</commit_message>
<xml_diff>
--- a/docs/fanli.pptx
+++ b/docs/fanli.pptx
@@ -5,7 +5,7 @@
     <p:sldMasterId id="2147483648" r:id="rId1"/>
   </p:sldMasterIdLst>
   <p:notesMasterIdLst>
-    <p:notesMasterId r:id="rId10"/>
+    <p:notesMasterId r:id="rId11"/>
   </p:notesMasterIdLst>
   <p:sldIdLst>
     <p:sldId id="256" r:id="rId2"/>
@@ -13,9 +13,10 @@
     <p:sldId id="258" r:id="rId4"/>
     <p:sldId id="263" r:id="rId5"/>
     <p:sldId id="264" r:id="rId6"/>
-    <p:sldId id="260" r:id="rId7"/>
-    <p:sldId id="262" r:id="rId8"/>
-    <p:sldId id="261" r:id="rId9"/>
+    <p:sldId id="265" r:id="rId7"/>
+    <p:sldId id="260" r:id="rId8"/>
+    <p:sldId id="262" r:id="rId9"/>
+    <p:sldId id="261" r:id="rId10"/>
   </p:sldIdLst>
   <p:sldSz cx="12192000" cy="6858000"/>
   <p:notesSz cx="6858000" cy="9144000"/>
@@ -638,7 +639,7 @@
           <a:p>
             <a:fld id="{B2B72CC6-03DF-4493-8786-AC08B89E6C16}" type="slidenum">
               <a:rPr lang="en-US" smtClean="0"/>
-              <a:t>6</a:t>
+              <a:t>7</a:t>
             </a:fld>
             <a:endParaRPr lang="en-US"/>
           </a:p>
@@ -824,7 +825,7 @@
           <a:p>
             <a:fld id="{B2B72CC6-03DF-4493-8786-AC08B89E6C16}" type="slidenum">
               <a:rPr lang="en-US" smtClean="0"/>
-              <a:t>7</a:t>
+              <a:t>8</a:t>
             </a:fld>
             <a:endParaRPr lang="en-US"/>
           </a:p>
@@ -4458,7 +4459,7 @@
             </a:pPr>
             <a:r>
               <a:rPr lang="en-US" sz="2400" dirty="0"/>
-              <a:t>Pre-trained word embeddings:</a:t>
+              <a:t>Pre-trained embeddings weights:</a:t>
             </a:r>
           </a:p>
           <a:p>
@@ -4625,7 +4626,7 @@
             </a:pPr>
             <a:r>
               <a:rPr lang="en-US" sz="2400" dirty="0"/>
-              <a:t>Pre-trained word embeddings:</a:t>
+              <a:t>Pre-trained embeddings weights :</a:t>
             </a:r>
           </a:p>
           <a:p>
@@ -4783,6 +4784,139 @@
 </file>
 
 <file path=ppt/slides/slide6.xml><?xml version="1.0" encoding="utf-8"?>
+<p:sld xmlns:a="http://schemas.openxmlformats.org/drawingml/2006/main" xmlns:r="http://schemas.openxmlformats.org/officeDocument/2006/relationships" xmlns:p="http://schemas.openxmlformats.org/presentationml/2006/main">
+  <p:cSld>
+    <p:spTree>
+      <p:nvGrpSpPr>
+        <p:cNvPr id="1" name=""/>
+        <p:cNvGrpSpPr/>
+        <p:nvPr/>
+      </p:nvGrpSpPr>
+      <p:grpSpPr>
+        <a:xfrm>
+          <a:off x="0" y="0"/>
+          <a:ext cx="0" cy="0"/>
+          <a:chOff x="0" y="0"/>
+          <a:chExt cx="0" cy="0"/>
+        </a:xfrm>
+      </p:grpSpPr>
+      <p:sp>
+        <p:nvSpPr>
+          <p:cNvPr id="3" name="Title 1">
+            <a:extLst>
+              <a:ext uri="{FF2B5EF4-FFF2-40B4-BE49-F238E27FC236}">
+                <a16:creationId xmlns:a16="http://schemas.microsoft.com/office/drawing/2014/main" id="{6A8C1FC6-173E-4407-89CA-ECADA0A5A38A}"/>
+              </a:ext>
+            </a:extLst>
+          </p:cNvPr>
+          <p:cNvSpPr>
+            <a:spLocks noGrp="1"/>
+          </p:cNvSpPr>
+          <p:nvPr>
+            <p:ph type="title"/>
+          </p:nvPr>
+        </p:nvSpPr>
+        <p:spPr>
+          <a:xfrm>
+            <a:off x="838200" y="365125"/>
+            <a:ext cx="10515600" cy="1325563"/>
+          </a:xfrm>
+        </p:spPr>
+        <p:txBody>
+          <a:bodyPr>
+            <a:normAutofit/>
+          </a:bodyPr>
+          <a:lstStyle/>
+          <a:p>
+            <a:r>
+              <a:rPr lang="en-US" sz="3600" b="1" dirty="0"/>
+              <a:t>Transfer Learning vs. Learning from scratch</a:t>
+            </a:r>
+          </a:p>
+        </p:txBody>
+      </p:sp>
+      <p:sp>
+        <p:nvSpPr>
+          <p:cNvPr id="4" name="TextBox 3">
+            <a:extLst>
+              <a:ext uri="{FF2B5EF4-FFF2-40B4-BE49-F238E27FC236}">
+                <a16:creationId xmlns:a16="http://schemas.microsoft.com/office/drawing/2014/main" id="{C451290D-AAA3-4776-99CF-4099DA7DAD0F}"/>
+              </a:ext>
+            </a:extLst>
+          </p:cNvPr>
+          <p:cNvSpPr txBox="1"/>
+          <p:nvPr/>
+        </p:nvSpPr>
+        <p:spPr>
+          <a:xfrm>
+            <a:off x="1264920" y="1905506"/>
+            <a:ext cx="9321800" cy="2677656"/>
+          </a:xfrm>
+          <a:prstGeom prst="rect">
+            <a:avLst/>
+          </a:prstGeom>
+          <a:noFill/>
+        </p:spPr>
+        <p:txBody>
+          <a:bodyPr wrap="square" rtlCol="0">
+            <a:spAutoFit/>
+          </a:bodyPr>
+          <a:lstStyle/>
+          <a:p>
+            <a:pPr marL="342900" indent="-342900">
+              <a:buAutoNum type="arabicPeriod"/>
+            </a:pPr>
+            <a:r>
+              <a:rPr lang="en-US" sz="2400" dirty="0"/>
+              <a:t>Pre-trained CNN model performed better than CNN model learned from scratch</a:t>
+            </a:r>
+          </a:p>
+          <a:p>
+            <a:pPr marL="342900" indent="-342900">
+              <a:buAutoNum type="arabicPeriod"/>
+            </a:pPr>
+            <a:endParaRPr lang="en-US" sz="2400" dirty="0"/>
+          </a:p>
+          <a:p>
+            <a:pPr marL="342900" indent="-342900">
+              <a:buAutoNum type="arabicPeriod"/>
+            </a:pPr>
+            <a:r>
+              <a:rPr lang="en-US" sz="2400" dirty="0"/>
+              <a:t>Pre-trained embeddings weights performed better than embeddings weights learned from scratch</a:t>
+            </a:r>
+          </a:p>
+          <a:p>
+            <a:pPr marL="342900" indent="-342900">
+              <a:buAutoNum type="arabicPeriod"/>
+            </a:pPr>
+            <a:endParaRPr lang="en-US" sz="2400" dirty="0"/>
+          </a:p>
+          <a:p>
+            <a:pPr marL="342900" indent="-342900">
+              <a:buAutoNum type="arabicPeriod"/>
+            </a:pPr>
+            <a:r>
+              <a:rPr lang="en-US" sz="2400" dirty="0"/>
+              <a:t>We decided to use pre-trained CNN model and embeddings weights</a:t>
+            </a:r>
+          </a:p>
+        </p:txBody>
+      </p:sp>
+    </p:spTree>
+    <p:extLst>
+      <p:ext uri="{BB962C8B-B14F-4D97-AF65-F5344CB8AC3E}">
+        <p14:creationId xmlns:p14="http://schemas.microsoft.com/office/powerpoint/2010/main" val="2001464897"/>
+      </p:ext>
+    </p:extLst>
+  </p:cSld>
+  <p:clrMapOvr>
+    <a:masterClrMapping/>
+  </p:clrMapOvr>
+</p:sld>
+</file>
+
+<file path=ppt/slides/slide7.xml><?xml version="1.0" encoding="utf-8"?>
 <p:sld xmlns:a="http://schemas.openxmlformats.org/drawingml/2006/main" xmlns:r="http://schemas.openxmlformats.org/officeDocument/2006/relationships" xmlns:p="http://schemas.openxmlformats.org/presentationml/2006/main">
   <p:cSld>
     <p:spTree>
@@ -5808,7 +5942,7 @@
 </p:sld>
 </file>
 
-<file path=ppt/slides/slide7.xml><?xml version="1.0" encoding="utf-8"?>
+<file path=ppt/slides/slide8.xml><?xml version="1.0" encoding="utf-8"?>
 <p:sld xmlns:a="http://schemas.openxmlformats.org/drawingml/2006/main" xmlns:r="http://schemas.openxmlformats.org/officeDocument/2006/relationships" xmlns:p="http://schemas.openxmlformats.org/presentationml/2006/main">
   <p:cSld>
     <p:spTree>
@@ -6871,7 +7005,7 @@
 </p:sld>
 </file>
 
-<file path=ppt/slides/slide8.xml><?xml version="1.0" encoding="utf-8"?>
+<file path=ppt/slides/slide9.xml><?xml version="1.0" encoding="utf-8"?>
 <p:sld xmlns:a="http://schemas.openxmlformats.org/drawingml/2006/main" xmlns:r="http://schemas.openxmlformats.org/officeDocument/2006/relationships" xmlns:p="http://schemas.openxmlformats.org/presentationml/2006/main">
   <p:cSld>
     <p:spTree>

</xml_diff>